<commit_message>
docs: Add a favicon (#669)
</commit_message>
<xml_diff>
--- a/docs/diagrams/logo.pptx
+++ b/docs/diagrams/logo.pptx
@@ -105,6 +105,11 @@
       </a:defRPr>
     </a:lvl9pPr>
   </p:defaultTextStyle>
+  <p:extLst>
+    <p:ext uri="{EFAFB233-063F-42B5-8137-9DF3F51BA10A}">
+      <p15:sldGuideLst xmlns:p15="http://schemas.microsoft.com/office/powerpoint/2012/main"/>
+    </p:ext>
+  </p:extLst>
 </p:presentation>
 </file>
 
@@ -239,7 +244,7 @@
           <a:p>
             <a:fld id="{A673024A-D71A-4A77-9B06-9B93C6905015}" type="datetimeFigureOut">
               <a:rPr lang="en-US" smtClean="0"/>
-              <a:t>2018-03-30</a:t>
+              <a:t>05-Feb-19</a:t>
             </a:fld>
             <a:endParaRPr lang="en-US"/>
           </a:p>
@@ -409,7 +414,7 @@
           <a:p>
             <a:fld id="{A673024A-D71A-4A77-9B06-9B93C6905015}" type="datetimeFigureOut">
               <a:rPr lang="en-US" smtClean="0"/>
-              <a:t>2018-03-30</a:t>
+              <a:t>05-Feb-19</a:t>
             </a:fld>
             <a:endParaRPr lang="en-US"/>
           </a:p>
@@ -589,7 +594,7 @@
           <a:p>
             <a:fld id="{A673024A-D71A-4A77-9B06-9B93C6905015}" type="datetimeFigureOut">
               <a:rPr lang="en-US" smtClean="0"/>
-              <a:t>2018-03-30</a:t>
+              <a:t>05-Feb-19</a:t>
             </a:fld>
             <a:endParaRPr lang="en-US"/>
           </a:p>
@@ -759,7 +764,7 @@
           <a:p>
             <a:fld id="{A673024A-D71A-4A77-9B06-9B93C6905015}" type="datetimeFigureOut">
               <a:rPr lang="en-US" smtClean="0"/>
-              <a:t>2018-03-30</a:t>
+              <a:t>05-Feb-19</a:t>
             </a:fld>
             <a:endParaRPr lang="en-US"/>
           </a:p>
@@ -1005,7 +1010,7 @@
           <a:p>
             <a:fld id="{A673024A-D71A-4A77-9B06-9B93C6905015}" type="datetimeFigureOut">
               <a:rPr lang="en-US" smtClean="0"/>
-              <a:t>2018-03-30</a:t>
+              <a:t>05-Feb-19</a:t>
             </a:fld>
             <a:endParaRPr lang="en-US"/>
           </a:p>
@@ -1237,7 +1242,7 @@
           <a:p>
             <a:fld id="{A673024A-D71A-4A77-9B06-9B93C6905015}" type="datetimeFigureOut">
               <a:rPr lang="en-US" smtClean="0"/>
-              <a:t>2018-03-30</a:t>
+              <a:t>05-Feb-19</a:t>
             </a:fld>
             <a:endParaRPr lang="en-US"/>
           </a:p>
@@ -1604,7 +1609,7 @@
           <a:p>
             <a:fld id="{A673024A-D71A-4A77-9B06-9B93C6905015}" type="datetimeFigureOut">
               <a:rPr lang="en-US" smtClean="0"/>
-              <a:t>2018-03-30</a:t>
+              <a:t>05-Feb-19</a:t>
             </a:fld>
             <a:endParaRPr lang="en-US"/>
           </a:p>
@@ -1722,7 +1727,7 @@
           <a:p>
             <a:fld id="{A673024A-D71A-4A77-9B06-9B93C6905015}" type="datetimeFigureOut">
               <a:rPr lang="en-US" smtClean="0"/>
-              <a:t>2018-03-30</a:t>
+              <a:t>05-Feb-19</a:t>
             </a:fld>
             <a:endParaRPr lang="en-US"/>
           </a:p>
@@ -1817,7 +1822,7 @@
           <a:p>
             <a:fld id="{A673024A-D71A-4A77-9B06-9B93C6905015}" type="datetimeFigureOut">
               <a:rPr lang="en-US" smtClean="0"/>
-              <a:t>2018-03-30</a:t>
+              <a:t>05-Feb-19</a:t>
             </a:fld>
             <a:endParaRPr lang="en-US"/>
           </a:p>
@@ -2094,7 +2099,7 @@
           <a:p>
             <a:fld id="{A673024A-D71A-4A77-9B06-9B93C6905015}" type="datetimeFigureOut">
               <a:rPr lang="en-US" smtClean="0"/>
-              <a:t>2018-03-30</a:t>
+              <a:t>05-Feb-19</a:t>
             </a:fld>
             <a:endParaRPr lang="en-US"/>
           </a:p>
@@ -2347,7 +2352,7 @@
           <a:p>
             <a:fld id="{A673024A-D71A-4A77-9B06-9B93C6905015}" type="datetimeFigureOut">
               <a:rPr lang="en-US" smtClean="0"/>
-              <a:t>2018-03-30</a:t>
+              <a:t>05-Feb-19</a:t>
             </a:fld>
             <a:endParaRPr lang="en-US"/>
           </a:p>
@@ -2560,7 +2565,7 @@
           <a:p>
             <a:fld id="{A673024A-D71A-4A77-9B06-9B93C6905015}" type="datetimeFigureOut">
               <a:rPr lang="en-US" smtClean="0"/>
-              <a:t>2018-03-30</a:t>
+              <a:t>05-Feb-19</a:t>
             </a:fld>
             <a:endParaRPr lang="en-US"/>
           </a:p>
@@ -3361,6 +3366,83 @@
           </a:prstGeom>
         </p:spPr>
       </p:pic>
+      <p:sp>
+        <p:nvSpPr>
+          <p:cNvPr id="8" name="Flowchart: Connector 7"/>
+          <p:cNvSpPr/>
+          <p:nvPr/>
+        </p:nvSpPr>
+        <p:spPr>
+          <a:xfrm>
+            <a:off x="3669401" y="4738168"/>
+            <a:ext cx="246743" cy="246743"/>
+          </a:xfrm>
+          <a:prstGeom prst="flowChartConnector">
+            <a:avLst/>
+          </a:prstGeom>
+          <a:solidFill>
+            <a:srgbClr val="00B0F0"/>
+          </a:solidFill>
+          <a:ln w="38100">
+            <a:solidFill>
+              <a:srgbClr val="00B0F0"/>
+            </a:solidFill>
+          </a:ln>
+        </p:spPr>
+        <p:style>
+          <a:lnRef idx="2">
+            <a:schemeClr val="accent1">
+              <a:shade val="50000"/>
+            </a:schemeClr>
+          </a:lnRef>
+          <a:fillRef idx="1">
+            <a:schemeClr val="accent1"/>
+          </a:fillRef>
+          <a:effectRef idx="0">
+            <a:schemeClr val="accent1"/>
+          </a:effectRef>
+          <a:fontRef idx="minor">
+            <a:schemeClr val="lt1"/>
+          </a:fontRef>
+        </p:style>
+        <p:txBody>
+          <a:bodyPr rtlCol="0" anchor="ctr"/>
+          <a:lstStyle/>
+          <a:p>
+            <a:pPr algn="ctr"/>
+            <a:r>
+              <a:rPr lang="en-US" b="1" dirty="0" smtClean="0"/>
+              <a:t>M</a:t>
+            </a:r>
+            <a:endParaRPr lang="en-US" b="1" dirty="0"/>
+          </a:p>
+        </p:txBody>
+      </p:sp>
+      <p:pic>
+        <p:nvPicPr>
+          <p:cNvPr id="9" name="Picture 8"/>
+          <p:cNvPicPr>
+            <a:picLocks noChangeAspect="1"/>
+          </p:cNvPicPr>
+          <p:nvPr/>
+        </p:nvPicPr>
+        <p:blipFill>
+          <a:blip r:embed="rId3"/>
+          <a:srcRect l="19608" t="13461" r="19608" b="25000"/>
+          <a:stretch>
+            <a:fillRect/>
+          </a:stretch>
+        </p:blipFill>
+        <p:spPr>
+          <a:xfrm>
+            <a:off x="4097199" y="4738168"/>
+            <a:ext cx="296460" cy="303891"/>
+          </a:xfrm>
+          <a:prstGeom prst="rect">
+            <a:avLst/>
+          </a:prstGeom>
+        </p:spPr>
+      </p:pic>
     </p:spTree>
     <p:extLst>
       <p:ext uri="{BB962C8B-B14F-4D97-AF65-F5344CB8AC3E}">

</xml_diff>

<commit_message>
Change topNav color to match branch color
</commit_message>
<xml_diff>
--- a/docs/diagrams/logo.pptx
+++ b/docs/diagrams/logo.pptx
@@ -7,6 +7,7 @@
   <p:sldIdLst>
     <p:sldId id="256" r:id="rId2"/>
     <p:sldId id="257" r:id="rId3"/>
+    <p:sldId id="258" r:id="rId4"/>
   </p:sldIdLst>
   <p:sldSz cx="12192000" cy="6858000"/>
   <p:notesSz cx="6858000" cy="9144000"/>
@@ -244,7 +245,7 @@
           <a:p>
             <a:fld id="{A673024A-D71A-4A77-9B06-9B93C6905015}" type="datetimeFigureOut">
               <a:rPr lang="en-US" smtClean="0"/>
-              <a:t>05-Feb-19</a:t>
+              <a:t>07-Apr-19</a:t>
             </a:fld>
             <a:endParaRPr lang="en-US"/>
           </a:p>
@@ -414,7 +415,7 @@
           <a:p>
             <a:fld id="{A673024A-D71A-4A77-9B06-9B93C6905015}" type="datetimeFigureOut">
               <a:rPr lang="en-US" smtClean="0"/>
-              <a:t>05-Feb-19</a:t>
+              <a:t>07-Apr-19</a:t>
             </a:fld>
             <a:endParaRPr lang="en-US"/>
           </a:p>
@@ -594,7 +595,7 @@
           <a:p>
             <a:fld id="{A673024A-D71A-4A77-9B06-9B93C6905015}" type="datetimeFigureOut">
               <a:rPr lang="en-US" smtClean="0"/>
-              <a:t>05-Feb-19</a:t>
+              <a:t>07-Apr-19</a:t>
             </a:fld>
             <a:endParaRPr lang="en-US"/>
           </a:p>
@@ -764,7 +765,7 @@
           <a:p>
             <a:fld id="{A673024A-D71A-4A77-9B06-9B93C6905015}" type="datetimeFigureOut">
               <a:rPr lang="en-US" smtClean="0"/>
-              <a:t>05-Feb-19</a:t>
+              <a:t>07-Apr-19</a:t>
             </a:fld>
             <a:endParaRPr lang="en-US"/>
           </a:p>
@@ -1010,7 +1011,7 @@
           <a:p>
             <a:fld id="{A673024A-D71A-4A77-9B06-9B93C6905015}" type="datetimeFigureOut">
               <a:rPr lang="en-US" smtClean="0"/>
-              <a:t>05-Feb-19</a:t>
+              <a:t>07-Apr-19</a:t>
             </a:fld>
             <a:endParaRPr lang="en-US"/>
           </a:p>
@@ -1242,7 +1243,7 @@
           <a:p>
             <a:fld id="{A673024A-D71A-4A77-9B06-9B93C6905015}" type="datetimeFigureOut">
               <a:rPr lang="en-US" smtClean="0"/>
-              <a:t>05-Feb-19</a:t>
+              <a:t>07-Apr-19</a:t>
             </a:fld>
             <a:endParaRPr lang="en-US"/>
           </a:p>
@@ -1609,7 +1610,7 @@
           <a:p>
             <a:fld id="{A673024A-D71A-4A77-9B06-9B93C6905015}" type="datetimeFigureOut">
               <a:rPr lang="en-US" smtClean="0"/>
-              <a:t>05-Feb-19</a:t>
+              <a:t>07-Apr-19</a:t>
             </a:fld>
             <a:endParaRPr lang="en-US"/>
           </a:p>
@@ -1727,7 +1728,7 @@
           <a:p>
             <a:fld id="{A673024A-D71A-4A77-9B06-9B93C6905015}" type="datetimeFigureOut">
               <a:rPr lang="en-US" smtClean="0"/>
-              <a:t>05-Feb-19</a:t>
+              <a:t>07-Apr-19</a:t>
             </a:fld>
             <a:endParaRPr lang="en-US"/>
           </a:p>
@@ -1822,7 +1823,7 @@
           <a:p>
             <a:fld id="{A673024A-D71A-4A77-9B06-9B93C6905015}" type="datetimeFigureOut">
               <a:rPr lang="en-US" smtClean="0"/>
-              <a:t>05-Feb-19</a:t>
+              <a:t>07-Apr-19</a:t>
             </a:fld>
             <a:endParaRPr lang="en-US"/>
           </a:p>
@@ -2099,7 +2100,7 @@
           <a:p>
             <a:fld id="{A673024A-D71A-4A77-9B06-9B93C6905015}" type="datetimeFigureOut">
               <a:rPr lang="en-US" smtClean="0"/>
-              <a:t>05-Feb-19</a:t>
+              <a:t>07-Apr-19</a:t>
             </a:fld>
             <a:endParaRPr lang="en-US"/>
           </a:p>
@@ -2352,7 +2353,7 @@
           <a:p>
             <a:fld id="{A673024A-D71A-4A77-9B06-9B93C6905015}" type="datetimeFigureOut">
               <a:rPr lang="en-US" smtClean="0"/>
-              <a:t>05-Feb-19</a:t>
+              <a:t>07-Apr-19</a:t>
             </a:fld>
             <a:endParaRPr lang="en-US"/>
           </a:p>
@@ -2565,7 +2566,7 @@
           <a:p>
             <a:fld id="{A673024A-D71A-4A77-9B06-9B93C6905015}" type="datetimeFigureOut">
               <a:rPr lang="en-US" smtClean="0"/>
-              <a:t>05-Feb-19</a:t>
+              <a:t>07-Apr-19</a:t>
             </a:fld>
             <a:endParaRPr lang="en-US"/>
           </a:p>
@@ -3890,6 +3891,842 @@
 </p:sld>
 </file>
 
+<file path=ppt/slides/slide3.xml><?xml version="1.0" encoding="utf-8"?>
+<p:sld xmlns:a="http://schemas.openxmlformats.org/drawingml/2006/main" xmlns:r="http://schemas.openxmlformats.org/officeDocument/2006/relationships" xmlns:p="http://schemas.openxmlformats.org/presentationml/2006/main">
+  <p:cSld>
+    <p:bg>
+      <p:bgPr>
+        <a:solidFill>
+          <a:srgbClr val="00B0F0"/>
+        </a:solidFill>
+        <a:effectLst/>
+      </p:bgPr>
+    </p:bg>
+    <p:spTree>
+      <p:nvGrpSpPr>
+        <p:cNvPr id="1" name=""/>
+        <p:cNvGrpSpPr/>
+        <p:nvPr/>
+      </p:nvGrpSpPr>
+      <p:grpSpPr>
+        <a:xfrm>
+          <a:off x="0" y="0"/>
+          <a:ext cx="0" cy="0"/>
+          <a:chOff x="0" y="0"/>
+          <a:chExt cx="0" cy="0"/>
+        </a:xfrm>
+      </p:grpSpPr>
+      <p:sp>
+        <p:nvSpPr>
+          <p:cNvPr id="6" name="TextBox 12"/>
+          <p:cNvSpPr txBox="1"/>
+          <p:nvPr/>
+        </p:nvSpPr>
+        <p:spPr>
+          <a:xfrm>
+            <a:off x="406548" y="1284208"/>
+            <a:ext cx="2838254" cy="1008072"/>
+          </a:xfrm>
+          <a:prstGeom prst="rect">
+            <a:avLst/>
+          </a:prstGeom>
+          <a:noFill/>
+        </p:spPr>
+        <p:txBody>
+          <a:bodyPr wrap="square" lIns="0" tIns="0" rIns="0" bIns="0" rtlCol="0" anchor="b" anchorCtr="0">
+            <a:noAutofit/>
+          </a:bodyPr>
+          <a:lstStyle/>
+          <a:p>
+            <a:r>
+              <a:rPr lang="en-US" sz="8000" dirty="0" smtClean="0">
+                <a:latin typeface="Franklin Gothic Heavy" panose="020B0903020102020204" pitchFamily="34" charset="0"/>
+              </a:rPr>
+              <a:t>Mark</a:t>
+            </a:r>
+            <a:endParaRPr lang="en-US" sz="8000" dirty="0">
+              <a:latin typeface="Franklin Gothic Heavy" panose="020B0903020102020204" pitchFamily="34" charset="0"/>
+            </a:endParaRPr>
+          </a:p>
+        </p:txBody>
+      </p:sp>
+      <p:cxnSp>
+        <p:nvCxnSpPr>
+          <p:cNvPr id="7" name="Straight Connector 13"/>
+          <p:cNvCxnSpPr/>
+          <p:nvPr/>
+        </p:nvCxnSpPr>
+        <p:spPr>
+          <a:xfrm>
+            <a:off x="540228" y="2217034"/>
+            <a:ext cx="2300167" cy="0"/>
+          </a:xfrm>
+          <a:prstGeom prst="line">
+            <a:avLst/>
+          </a:prstGeom>
+          <a:ln w="149225" cap="rnd">
+            <a:solidFill>
+              <a:schemeClr val="tx1"/>
+            </a:solidFill>
+            <a:prstDash val="sysDot"/>
+          </a:ln>
+        </p:spPr>
+        <p:style>
+          <a:lnRef idx="1">
+            <a:schemeClr val="accent1"/>
+          </a:lnRef>
+          <a:fillRef idx="0">
+            <a:schemeClr val="accent1"/>
+          </a:fillRef>
+          <a:effectRef idx="0">
+            <a:schemeClr val="accent1"/>
+          </a:effectRef>
+          <a:fontRef idx="minor">
+            <a:schemeClr val="tx1"/>
+          </a:fontRef>
+        </p:style>
+      </p:cxnSp>
+      <p:sp>
+        <p:nvSpPr>
+          <p:cNvPr id="8" name="Rectangular Callout 14"/>
+          <p:cNvSpPr/>
+          <p:nvPr/>
+        </p:nvSpPr>
+        <p:spPr>
+          <a:xfrm>
+            <a:off x="2863340" y="1364003"/>
+            <a:ext cx="2496011" cy="929230"/>
+          </a:xfrm>
+          <a:custGeom>
+            <a:avLst/>
+            <a:gdLst>
+              <a:gd name="connsiteX0" fmla="*/ 0 w 2232875"/>
+              <a:gd name="connsiteY0" fmla="*/ 0 h 929230"/>
+              <a:gd name="connsiteX1" fmla="*/ 372146 w 2232875"/>
+              <a:gd name="connsiteY1" fmla="*/ 0 h 929230"/>
+              <a:gd name="connsiteX2" fmla="*/ 372146 w 2232875"/>
+              <a:gd name="connsiteY2" fmla="*/ 0 h 929230"/>
+              <a:gd name="connsiteX3" fmla="*/ 930365 w 2232875"/>
+              <a:gd name="connsiteY3" fmla="*/ 0 h 929230"/>
+              <a:gd name="connsiteX4" fmla="*/ 2232875 w 2232875"/>
+              <a:gd name="connsiteY4" fmla="*/ 0 h 929230"/>
+              <a:gd name="connsiteX5" fmla="*/ 2232875 w 2232875"/>
+              <a:gd name="connsiteY5" fmla="*/ 154872 h 929230"/>
+              <a:gd name="connsiteX6" fmla="*/ 2232875 w 2232875"/>
+              <a:gd name="connsiteY6" fmla="*/ 154872 h 929230"/>
+              <a:gd name="connsiteX7" fmla="*/ 2232875 w 2232875"/>
+              <a:gd name="connsiteY7" fmla="*/ 387179 h 929230"/>
+              <a:gd name="connsiteX8" fmla="*/ 2232875 w 2232875"/>
+              <a:gd name="connsiteY8" fmla="*/ 929230 h 929230"/>
+              <a:gd name="connsiteX9" fmla="*/ 930365 w 2232875"/>
+              <a:gd name="connsiteY9" fmla="*/ 929230 h 929230"/>
+              <a:gd name="connsiteX10" fmla="*/ 372146 w 2232875"/>
+              <a:gd name="connsiteY10" fmla="*/ 929230 h 929230"/>
+              <a:gd name="connsiteX11" fmla="*/ 372146 w 2232875"/>
+              <a:gd name="connsiteY11" fmla="*/ 929230 h 929230"/>
+              <a:gd name="connsiteX12" fmla="*/ 0 w 2232875"/>
+              <a:gd name="connsiteY12" fmla="*/ 929230 h 929230"/>
+              <a:gd name="connsiteX13" fmla="*/ 0 w 2232875"/>
+              <a:gd name="connsiteY13" fmla="*/ 387179 h 929230"/>
+              <a:gd name="connsiteX14" fmla="*/ -253610 w 2232875"/>
+              <a:gd name="connsiteY14" fmla="*/ 397683 h 929230"/>
+              <a:gd name="connsiteX15" fmla="*/ 0 w 2232875"/>
+              <a:gd name="connsiteY15" fmla="*/ 154872 h 929230"/>
+              <a:gd name="connsiteX16" fmla="*/ 0 w 2232875"/>
+              <a:gd name="connsiteY16" fmla="*/ 0 h 929230"/>
+              <a:gd name="connsiteX0" fmla="*/ 253610 w 2486485"/>
+              <a:gd name="connsiteY0" fmla="*/ 0 h 929230"/>
+              <a:gd name="connsiteX1" fmla="*/ 625756 w 2486485"/>
+              <a:gd name="connsiteY1" fmla="*/ 0 h 929230"/>
+              <a:gd name="connsiteX2" fmla="*/ 625756 w 2486485"/>
+              <a:gd name="connsiteY2" fmla="*/ 0 h 929230"/>
+              <a:gd name="connsiteX3" fmla="*/ 1183975 w 2486485"/>
+              <a:gd name="connsiteY3" fmla="*/ 0 h 929230"/>
+              <a:gd name="connsiteX4" fmla="*/ 2486485 w 2486485"/>
+              <a:gd name="connsiteY4" fmla="*/ 0 h 929230"/>
+              <a:gd name="connsiteX5" fmla="*/ 2486485 w 2486485"/>
+              <a:gd name="connsiteY5" fmla="*/ 154872 h 929230"/>
+              <a:gd name="connsiteX6" fmla="*/ 2486485 w 2486485"/>
+              <a:gd name="connsiteY6" fmla="*/ 154872 h 929230"/>
+              <a:gd name="connsiteX7" fmla="*/ 2486485 w 2486485"/>
+              <a:gd name="connsiteY7" fmla="*/ 387179 h 929230"/>
+              <a:gd name="connsiteX8" fmla="*/ 2486485 w 2486485"/>
+              <a:gd name="connsiteY8" fmla="*/ 929230 h 929230"/>
+              <a:gd name="connsiteX9" fmla="*/ 1183975 w 2486485"/>
+              <a:gd name="connsiteY9" fmla="*/ 929230 h 929230"/>
+              <a:gd name="connsiteX10" fmla="*/ 625756 w 2486485"/>
+              <a:gd name="connsiteY10" fmla="*/ 929230 h 929230"/>
+              <a:gd name="connsiteX11" fmla="*/ 625756 w 2486485"/>
+              <a:gd name="connsiteY11" fmla="*/ 929230 h 929230"/>
+              <a:gd name="connsiteX12" fmla="*/ 253610 w 2486485"/>
+              <a:gd name="connsiteY12" fmla="*/ 929230 h 929230"/>
+              <a:gd name="connsiteX13" fmla="*/ 244085 w 2486485"/>
+              <a:gd name="connsiteY13" fmla="*/ 787229 h 929230"/>
+              <a:gd name="connsiteX14" fmla="*/ 0 w 2486485"/>
+              <a:gd name="connsiteY14" fmla="*/ 397683 h 929230"/>
+              <a:gd name="connsiteX15" fmla="*/ 253610 w 2486485"/>
+              <a:gd name="connsiteY15" fmla="*/ 154872 h 929230"/>
+              <a:gd name="connsiteX16" fmla="*/ 253610 w 2486485"/>
+              <a:gd name="connsiteY16" fmla="*/ 0 h 929230"/>
+              <a:gd name="connsiteX0" fmla="*/ 227416 w 2460291"/>
+              <a:gd name="connsiteY0" fmla="*/ 0 h 929230"/>
+              <a:gd name="connsiteX1" fmla="*/ 599562 w 2460291"/>
+              <a:gd name="connsiteY1" fmla="*/ 0 h 929230"/>
+              <a:gd name="connsiteX2" fmla="*/ 599562 w 2460291"/>
+              <a:gd name="connsiteY2" fmla="*/ 0 h 929230"/>
+              <a:gd name="connsiteX3" fmla="*/ 1157781 w 2460291"/>
+              <a:gd name="connsiteY3" fmla="*/ 0 h 929230"/>
+              <a:gd name="connsiteX4" fmla="*/ 2460291 w 2460291"/>
+              <a:gd name="connsiteY4" fmla="*/ 0 h 929230"/>
+              <a:gd name="connsiteX5" fmla="*/ 2460291 w 2460291"/>
+              <a:gd name="connsiteY5" fmla="*/ 154872 h 929230"/>
+              <a:gd name="connsiteX6" fmla="*/ 2460291 w 2460291"/>
+              <a:gd name="connsiteY6" fmla="*/ 154872 h 929230"/>
+              <a:gd name="connsiteX7" fmla="*/ 2460291 w 2460291"/>
+              <a:gd name="connsiteY7" fmla="*/ 387179 h 929230"/>
+              <a:gd name="connsiteX8" fmla="*/ 2460291 w 2460291"/>
+              <a:gd name="connsiteY8" fmla="*/ 929230 h 929230"/>
+              <a:gd name="connsiteX9" fmla="*/ 1157781 w 2460291"/>
+              <a:gd name="connsiteY9" fmla="*/ 929230 h 929230"/>
+              <a:gd name="connsiteX10" fmla="*/ 599562 w 2460291"/>
+              <a:gd name="connsiteY10" fmla="*/ 929230 h 929230"/>
+              <a:gd name="connsiteX11" fmla="*/ 599562 w 2460291"/>
+              <a:gd name="connsiteY11" fmla="*/ 929230 h 929230"/>
+              <a:gd name="connsiteX12" fmla="*/ 227416 w 2460291"/>
+              <a:gd name="connsiteY12" fmla="*/ 929230 h 929230"/>
+              <a:gd name="connsiteX13" fmla="*/ 217891 w 2460291"/>
+              <a:gd name="connsiteY13" fmla="*/ 787229 h 929230"/>
+              <a:gd name="connsiteX14" fmla="*/ 0 w 2460291"/>
+              <a:gd name="connsiteY14" fmla="*/ 390539 h 929230"/>
+              <a:gd name="connsiteX15" fmla="*/ 227416 w 2460291"/>
+              <a:gd name="connsiteY15" fmla="*/ 154872 h 929230"/>
+              <a:gd name="connsiteX16" fmla="*/ 227416 w 2460291"/>
+              <a:gd name="connsiteY16" fmla="*/ 0 h 929230"/>
+              <a:gd name="connsiteX0" fmla="*/ 215510 w 2448385"/>
+              <a:gd name="connsiteY0" fmla="*/ 0 h 929230"/>
+              <a:gd name="connsiteX1" fmla="*/ 587656 w 2448385"/>
+              <a:gd name="connsiteY1" fmla="*/ 0 h 929230"/>
+              <a:gd name="connsiteX2" fmla="*/ 587656 w 2448385"/>
+              <a:gd name="connsiteY2" fmla="*/ 0 h 929230"/>
+              <a:gd name="connsiteX3" fmla="*/ 1145875 w 2448385"/>
+              <a:gd name="connsiteY3" fmla="*/ 0 h 929230"/>
+              <a:gd name="connsiteX4" fmla="*/ 2448385 w 2448385"/>
+              <a:gd name="connsiteY4" fmla="*/ 0 h 929230"/>
+              <a:gd name="connsiteX5" fmla="*/ 2448385 w 2448385"/>
+              <a:gd name="connsiteY5" fmla="*/ 154872 h 929230"/>
+              <a:gd name="connsiteX6" fmla="*/ 2448385 w 2448385"/>
+              <a:gd name="connsiteY6" fmla="*/ 154872 h 929230"/>
+              <a:gd name="connsiteX7" fmla="*/ 2448385 w 2448385"/>
+              <a:gd name="connsiteY7" fmla="*/ 387179 h 929230"/>
+              <a:gd name="connsiteX8" fmla="*/ 2448385 w 2448385"/>
+              <a:gd name="connsiteY8" fmla="*/ 929230 h 929230"/>
+              <a:gd name="connsiteX9" fmla="*/ 1145875 w 2448385"/>
+              <a:gd name="connsiteY9" fmla="*/ 929230 h 929230"/>
+              <a:gd name="connsiteX10" fmla="*/ 587656 w 2448385"/>
+              <a:gd name="connsiteY10" fmla="*/ 929230 h 929230"/>
+              <a:gd name="connsiteX11" fmla="*/ 587656 w 2448385"/>
+              <a:gd name="connsiteY11" fmla="*/ 929230 h 929230"/>
+              <a:gd name="connsiteX12" fmla="*/ 215510 w 2448385"/>
+              <a:gd name="connsiteY12" fmla="*/ 929230 h 929230"/>
+              <a:gd name="connsiteX13" fmla="*/ 205985 w 2448385"/>
+              <a:gd name="connsiteY13" fmla="*/ 787229 h 929230"/>
+              <a:gd name="connsiteX14" fmla="*/ 0 w 2448385"/>
+              <a:gd name="connsiteY14" fmla="*/ 390539 h 929230"/>
+              <a:gd name="connsiteX15" fmla="*/ 215510 w 2448385"/>
+              <a:gd name="connsiteY15" fmla="*/ 154872 h 929230"/>
+              <a:gd name="connsiteX16" fmla="*/ 215510 w 2448385"/>
+              <a:gd name="connsiteY16" fmla="*/ 0 h 929230"/>
+            </a:gdLst>
+            <a:ahLst/>
+            <a:cxnLst>
+              <a:cxn ang="0">
+                <a:pos x="connsiteX0" y="connsiteY0"/>
+              </a:cxn>
+              <a:cxn ang="0">
+                <a:pos x="connsiteX1" y="connsiteY1"/>
+              </a:cxn>
+              <a:cxn ang="0">
+                <a:pos x="connsiteX2" y="connsiteY2"/>
+              </a:cxn>
+              <a:cxn ang="0">
+                <a:pos x="connsiteX3" y="connsiteY3"/>
+              </a:cxn>
+              <a:cxn ang="0">
+                <a:pos x="connsiteX4" y="connsiteY4"/>
+              </a:cxn>
+              <a:cxn ang="0">
+                <a:pos x="connsiteX5" y="connsiteY5"/>
+              </a:cxn>
+              <a:cxn ang="0">
+                <a:pos x="connsiteX6" y="connsiteY6"/>
+              </a:cxn>
+              <a:cxn ang="0">
+                <a:pos x="connsiteX7" y="connsiteY7"/>
+              </a:cxn>
+              <a:cxn ang="0">
+                <a:pos x="connsiteX8" y="connsiteY8"/>
+              </a:cxn>
+              <a:cxn ang="0">
+                <a:pos x="connsiteX9" y="connsiteY9"/>
+              </a:cxn>
+              <a:cxn ang="0">
+                <a:pos x="connsiteX10" y="connsiteY10"/>
+              </a:cxn>
+              <a:cxn ang="0">
+                <a:pos x="connsiteX11" y="connsiteY11"/>
+              </a:cxn>
+              <a:cxn ang="0">
+                <a:pos x="connsiteX12" y="connsiteY12"/>
+              </a:cxn>
+              <a:cxn ang="0">
+                <a:pos x="connsiteX13" y="connsiteY13"/>
+              </a:cxn>
+              <a:cxn ang="0">
+                <a:pos x="connsiteX14" y="connsiteY14"/>
+              </a:cxn>
+              <a:cxn ang="0">
+                <a:pos x="connsiteX15" y="connsiteY15"/>
+              </a:cxn>
+              <a:cxn ang="0">
+                <a:pos x="connsiteX16" y="connsiteY16"/>
+              </a:cxn>
+            </a:cxnLst>
+            <a:rect l="l" t="t" r="r" b="b"/>
+            <a:pathLst>
+              <a:path w="2448385" h="929230">
+                <a:moveTo>
+                  <a:pt x="215510" y="0"/>
+                </a:moveTo>
+                <a:lnTo>
+                  <a:pt x="587656" y="0"/>
+                </a:lnTo>
+                <a:lnTo>
+                  <a:pt x="587656" y="0"/>
+                </a:lnTo>
+                <a:lnTo>
+                  <a:pt x="1145875" y="0"/>
+                </a:lnTo>
+                <a:lnTo>
+                  <a:pt x="2448385" y="0"/>
+                </a:lnTo>
+                <a:lnTo>
+                  <a:pt x="2448385" y="154872"/>
+                </a:lnTo>
+                <a:lnTo>
+                  <a:pt x="2448385" y="154872"/>
+                </a:lnTo>
+                <a:lnTo>
+                  <a:pt x="2448385" y="387179"/>
+                </a:lnTo>
+                <a:lnTo>
+                  <a:pt x="2448385" y="929230"/>
+                </a:lnTo>
+                <a:lnTo>
+                  <a:pt x="1145875" y="929230"/>
+                </a:lnTo>
+                <a:lnTo>
+                  <a:pt x="587656" y="929230"/>
+                </a:lnTo>
+                <a:lnTo>
+                  <a:pt x="587656" y="929230"/>
+                </a:lnTo>
+                <a:lnTo>
+                  <a:pt x="215510" y="929230"/>
+                </a:lnTo>
+                <a:lnTo>
+                  <a:pt x="205985" y="787229"/>
+                </a:lnTo>
+                <a:lnTo>
+                  <a:pt x="0" y="390539"/>
+                </a:lnTo>
+                <a:lnTo>
+                  <a:pt x="215510" y="154872"/>
+                </a:lnTo>
+                <a:lnTo>
+                  <a:pt x="215510" y="0"/>
+                </a:lnTo>
+                <a:close/>
+              </a:path>
+            </a:pathLst>
+          </a:custGeom>
+          <a:solidFill>
+            <a:schemeClr val="tx1"/>
+          </a:solidFill>
+        </p:spPr>
+        <p:txBody>
+          <a:bodyPr wrap="square" lIns="0" tIns="0" rIns="45720" bIns="0" anchor="ctr" anchorCtr="0">
+            <a:noAutofit/>
+          </a:bodyPr>
+          <a:lstStyle/>
+          <a:p>
+            <a:pPr algn="r"/>
+            <a:r>
+              <a:rPr lang="en-US" sz="8200" dirty="0" smtClean="0">
+                <a:ln w="19050">
+                  <a:solidFill>
+                    <a:schemeClr val="tx1"/>
+                  </a:solidFill>
+                </a:ln>
+                <a:solidFill>
+                  <a:srgbClr val="00B0F0"/>
+                </a:solidFill>
+                <a:latin typeface="Franklin Gothic Heavy" panose="020B0903020102020204" pitchFamily="34" charset="0"/>
+              </a:rPr>
+              <a:t>Bind</a:t>
+            </a:r>
+            <a:endParaRPr lang="en-US" sz="8200" dirty="0">
+              <a:ln w="19050">
+                <a:solidFill>
+                  <a:schemeClr val="tx1"/>
+                </a:solidFill>
+              </a:ln>
+              <a:solidFill>
+                <a:srgbClr val="00B0F0"/>
+              </a:solidFill>
+            </a:endParaRPr>
+          </a:p>
+        </p:txBody>
+      </p:sp>
+      <p:pic>
+        <p:nvPicPr>
+          <p:cNvPr id="4" name="Picture 3"/>
+          <p:cNvPicPr>
+            <a:picLocks noChangeAspect="1"/>
+          </p:cNvPicPr>
+          <p:nvPr/>
+        </p:nvPicPr>
+        <p:blipFill>
+          <a:blip r:embed="rId2"/>
+          <a:srcRect l="11966" t="27679" b="28125"/>
+          <a:stretch>
+            <a:fillRect/>
+          </a:stretch>
+        </p:blipFill>
+        <p:spPr>
+          <a:xfrm>
+            <a:off x="459253" y="2914573"/>
+            <a:ext cx="4900098" cy="945749"/>
+          </a:xfrm>
+          <a:prstGeom prst="rect">
+            <a:avLst/>
+          </a:prstGeom>
+        </p:spPr>
+      </p:pic>
+      <p:sp>
+        <p:nvSpPr>
+          <p:cNvPr id="25" name="TextBox 12"/>
+          <p:cNvSpPr txBox="1"/>
+          <p:nvPr/>
+        </p:nvSpPr>
+        <p:spPr>
+          <a:xfrm>
+            <a:off x="6451748" y="1284208"/>
+            <a:ext cx="2838254" cy="1008072"/>
+          </a:xfrm>
+          <a:prstGeom prst="rect">
+            <a:avLst/>
+          </a:prstGeom>
+          <a:noFill/>
+        </p:spPr>
+        <p:txBody>
+          <a:bodyPr wrap="square" lIns="0" tIns="0" rIns="0" bIns="0" rtlCol="0" anchor="b" anchorCtr="0">
+            <a:noAutofit/>
+          </a:bodyPr>
+          <a:lstStyle/>
+          <a:p>
+            <a:r>
+              <a:rPr lang="en-US" sz="8000" dirty="0" smtClean="0">
+                <a:solidFill>
+                  <a:schemeClr val="bg1"/>
+                </a:solidFill>
+                <a:latin typeface="Franklin Gothic Heavy" panose="020B0903020102020204" pitchFamily="34" charset="0"/>
+              </a:rPr>
+              <a:t>Mark</a:t>
+            </a:r>
+            <a:endParaRPr lang="en-US" sz="8000" dirty="0">
+              <a:solidFill>
+                <a:schemeClr val="bg1"/>
+              </a:solidFill>
+              <a:latin typeface="Franklin Gothic Heavy" panose="020B0903020102020204" pitchFamily="34" charset="0"/>
+            </a:endParaRPr>
+          </a:p>
+        </p:txBody>
+      </p:sp>
+      <p:cxnSp>
+        <p:nvCxnSpPr>
+          <p:cNvPr id="26" name="Straight Connector 13"/>
+          <p:cNvCxnSpPr/>
+          <p:nvPr/>
+        </p:nvCxnSpPr>
+        <p:spPr>
+          <a:xfrm>
+            <a:off x="6585428" y="2217034"/>
+            <a:ext cx="2300167" cy="0"/>
+          </a:xfrm>
+          <a:prstGeom prst="line">
+            <a:avLst/>
+          </a:prstGeom>
+          <a:ln w="149225" cap="rnd">
+            <a:solidFill>
+              <a:schemeClr val="bg1"/>
+            </a:solidFill>
+            <a:prstDash val="sysDot"/>
+          </a:ln>
+        </p:spPr>
+        <p:style>
+          <a:lnRef idx="1">
+            <a:schemeClr val="accent1"/>
+          </a:lnRef>
+          <a:fillRef idx="0">
+            <a:schemeClr val="accent1"/>
+          </a:fillRef>
+          <a:effectRef idx="0">
+            <a:schemeClr val="accent1"/>
+          </a:effectRef>
+          <a:fontRef idx="minor">
+            <a:schemeClr val="tx1"/>
+          </a:fontRef>
+        </p:style>
+      </p:cxnSp>
+      <p:sp>
+        <p:nvSpPr>
+          <p:cNvPr id="27" name="Rectangular Callout 14"/>
+          <p:cNvSpPr/>
+          <p:nvPr/>
+        </p:nvSpPr>
+        <p:spPr>
+          <a:xfrm>
+            <a:off x="8908540" y="1364003"/>
+            <a:ext cx="2496011" cy="929230"/>
+          </a:xfrm>
+          <a:custGeom>
+            <a:avLst/>
+            <a:gdLst>
+              <a:gd name="connsiteX0" fmla="*/ 0 w 2232875"/>
+              <a:gd name="connsiteY0" fmla="*/ 0 h 929230"/>
+              <a:gd name="connsiteX1" fmla="*/ 372146 w 2232875"/>
+              <a:gd name="connsiteY1" fmla="*/ 0 h 929230"/>
+              <a:gd name="connsiteX2" fmla="*/ 372146 w 2232875"/>
+              <a:gd name="connsiteY2" fmla="*/ 0 h 929230"/>
+              <a:gd name="connsiteX3" fmla="*/ 930365 w 2232875"/>
+              <a:gd name="connsiteY3" fmla="*/ 0 h 929230"/>
+              <a:gd name="connsiteX4" fmla="*/ 2232875 w 2232875"/>
+              <a:gd name="connsiteY4" fmla="*/ 0 h 929230"/>
+              <a:gd name="connsiteX5" fmla="*/ 2232875 w 2232875"/>
+              <a:gd name="connsiteY5" fmla="*/ 154872 h 929230"/>
+              <a:gd name="connsiteX6" fmla="*/ 2232875 w 2232875"/>
+              <a:gd name="connsiteY6" fmla="*/ 154872 h 929230"/>
+              <a:gd name="connsiteX7" fmla="*/ 2232875 w 2232875"/>
+              <a:gd name="connsiteY7" fmla="*/ 387179 h 929230"/>
+              <a:gd name="connsiteX8" fmla="*/ 2232875 w 2232875"/>
+              <a:gd name="connsiteY8" fmla="*/ 929230 h 929230"/>
+              <a:gd name="connsiteX9" fmla="*/ 930365 w 2232875"/>
+              <a:gd name="connsiteY9" fmla="*/ 929230 h 929230"/>
+              <a:gd name="connsiteX10" fmla="*/ 372146 w 2232875"/>
+              <a:gd name="connsiteY10" fmla="*/ 929230 h 929230"/>
+              <a:gd name="connsiteX11" fmla="*/ 372146 w 2232875"/>
+              <a:gd name="connsiteY11" fmla="*/ 929230 h 929230"/>
+              <a:gd name="connsiteX12" fmla="*/ 0 w 2232875"/>
+              <a:gd name="connsiteY12" fmla="*/ 929230 h 929230"/>
+              <a:gd name="connsiteX13" fmla="*/ 0 w 2232875"/>
+              <a:gd name="connsiteY13" fmla="*/ 387179 h 929230"/>
+              <a:gd name="connsiteX14" fmla="*/ -253610 w 2232875"/>
+              <a:gd name="connsiteY14" fmla="*/ 397683 h 929230"/>
+              <a:gd name="connsiteX15" fmla="*/ 0 w 2232875"/>
+              <a:gd name="connsiteY15" fmla="*/ 154872 h 929230"/>
+              <a:gd name="connsiteX16" fmla="*/ 0 w 2232875"/>
+              <a:gd name="connsiteY16" fmla="*/ 0 h 929230"/>
+              <a:gd name="connsiteX0" fmla="*/ 253610 w 2486485"/>
+              <a:gd name="connsiteY0" fmla="*/ 0 h 929230"/>
+              <a:gd name="connsiteX1" fmla="*/ 625756 w 2486485"/>
+              <a:gd name="connsiteY1" fmla="*/ 0 h 929230"/>
+              <a:gd name="connsiteX2" fmla="*/ 625756 w 2486485"/>
+              <a:gd name="connsiteY2" fmla="*/ 0 h 929230"/>
+              <a:gd name="connsiteX3" fmla="*/ 1183975 w 2486485"/>
+              <a:gd name="connsiteY3" fmla="*/ 0 h 929230"/>
+              <a:gd name="connsiteX4" fmla="*/ 2486485 w 2486485"/>
+              <a:gd name="connsiteY4" fmla="*/ 0 h 929230"/>
+              <a:gd name="connsiteX5" fmla="*/ 2486485 w 2486485"/>
+              <a:gd name="connsiteY5" fmla="*/ 154872 h 929230"/>
+              <a:gd name="connsiteX6" fmla="*/ 2486485 w 2486485"/>
+              <a:gd name="connsiteY6" fmla="*/ 154872 h 929230"/>
+              <a:gd name="connsiteX7" fmla="*/ 2486485 w 2486485"/>
+              <a:gd name="connsiteY7" fmla="*/ 387179 h 929230"/>
+              <a:gd name="connsiteX8" fmla="*/ 2486485 w 2486485"/>
+              <a:gd name="connsiteY8" fmla="*/ 929230 h 929230"/>
+              <a:gd name="connsiteX9" fmla="*/ 1183975 w 2486485"/>
+              <a:gd name="connsiteY9" fmla="*/ 929230 h 929230"/>
+              <a:gd name="connsiteX10" fmla="*/ 625756 w 2486485"/>
+              <a:gd name="connsiteY10" fmla="*/ 929230 h 929230"/>
+              <a:gd name="connsiteX11" fmla="*/ 625756 w 2486485"/>
+              <a:gd name="connsiteY11" fmla="*/ 929230 h 929230"/>
+              <a:gd name="connsiteX12" fmla="*/ 253610 w 2486485"/>
+              <a:gd name="connsiteY12" fmla="*/ 929230 h 929230"/>
+              <a:gd name="connsiteX13" fmla="*/ 244085 w 2486485"/>
+              <a:gd name="connsiteY13" fmla="*/ 787229 h 929230"/>
+              <a:gd name="connsiteX14" fmla="*/ 0 w 2486485"/>
+              <a:gd name="connsiteY14" fmla="*/ 397683 h 929230"/>
+              <a:gd name="connsiteX15" fmla="*/ 253610 w 2486485"/>
+              <a:gd name="connsiteY15" fmla="*/ 154872 h 929230"/>
+              <a:gd name="connsiteX16" fmla="*/ 253610 w 2486485"/>
+              <a:gd name="connsiteY16" fmla="*/ 0 h 929230"/>
+              <a:gd name="connsiteX0" fmla="*/ 227416 w 2460291"/>
+              <a:gd name="connsiteY0" fmla="*/ 0 h 929230"/>
+              <a:gd name="connsiteX1" fmla="*/ 599562 w 2460291"/>
+              <a:gd name="connsiteY1" fmla="*/ 0 h 929230"/>
+              <a:gd name="connsiteX2" fmla="*/ 599562 w 2460291"/>
+              <a:gd name="connsiteY2" fmla="*/ 0 h 929230"/>
+              <a:gd name="connsiteX3" fmla="*/ 1157781 w 2460291"/>
+              <a:gd name="connsiteY3" fmla="*/ 0 h 929230"/>
+              <a:gd name="connsiteX4" fmla="*/ 2460291 w 2460291"/>
+              <a:gd name="connsiteY4" fmla="*/ 0 h 929230"/>
+              <a:gd name="connsiteX5" fmla="*/ 2460291 w 2460291"/>
+              <a:gd name="connsiteY5" fmla="*/ 154872 h 929230"/>
+              <a:gd name="connsiteX6" fmla="*/ 2460291 w 2460291"/>
+              <a:gd name="connsiteY6" fmla="*/ 154872 h 929230"/>
+              <a:gd name="connsiteX7" fmla="*/ 2460291 w 2460291"/>
+              <a:gd name="connsiteY7" fmla="*/ 387179 h 929230"/>
+              <a:gd name="connsiteX8" fmla="*/ 2460291 w 2460291"/>
+              <a:gd name="connsiteY8" fmla="*/ 929230 h 929230"/>
+              <a:gd name="connsiteX9" fmla="*/ 1157781 w 2460291"/>
+              <a:gd name="connsiteY9" fmla="*/ 929230 h 929230"/>
+              <a:gd name="connsiteX10" fmla="*/ 599562 w 2460291"/>
+              <a:gd name="connsiteY10" fmla="*/ 929230 h 929230"/>
+              <a:gd name="connsiteX11" fmla="*/ 599562 w 2460291"/>
+              <a:gd name="connsiteY11" fmla="*/ 929230 h 929230"/>
+              <a:gd name="connsiteX12" fmla="*/ 227416 w 2460291"/>
+              <a:gd name="connsiteY12" fmla="*/ 929230 h 929230"/>
+              <a:gd name="connsiteX13" fmla="*/ 217891 w 2460291"/>
+              <a:gd name="connsiteY13" fmla="*/ 787229 h 929230"/>
+              <a:gd name="connsiteX14" fmla="*/ 0 w 2460291"/>
+              <a:gd name="connsiteY14" fmla="*/ 390539 h 929230"/>
+              <a:gd name="connsiteX15" fmla="*/ 227416 w 2460291"/>
+              <a:gd name="connsiteY15" fmla="*/ 154872 h 929230"/>
+              <a:gd name="connsiteX16" fmla="*/ 227416 w 2460291"/>
+              <a:gd name="connsiteY16" fmla="*/ 0 h 929230"/>
+              <a:gd name="connsiteX0" fmla="*/ 215510 w 2448385"/>
+              <a:gd name="connsiteY0" fmla="*/ 0 h 929230"/>
+              <a:gd name="connsiteX1" fmla="*/ 587656 w 2448385"/>
+              <a:gd name="connsiteY1" fmla="*/ 0 h 929230"/>
+              <a:gd name="connsiteX2" fmla="*/ 587656 w 2448385"/>
+              <a:gd name="connsiteY2" fmla="*/ 0 h 929230"/>
+              <a:gd name="connsiteX3" fmla="*/ 1145875 w 2448385"/>
+              <a:gd name="connsiteY3" fmla="*/ 0 h 929230"/>
+              <a:gd name="connsiteX4" fmla="*/ 2448385 w 2448385"/>
+              <a:gd name="connsiteY4" fmla="*/ 0 h 929230"/>
+              <a:gd name="connsiteX5" fmla="*/ 2448385 w 2448385"/>
+              <a:gd name="connsiteY5" fmla="*/ 154872 h 929230"/>
+              <a:gd name="connsiteX6" fmla="*/ 2448385 w 2448385"/>
+              <a:gd name="connsiteY6" fmla="*/ 154872 h 929230"/>
+              <a:gd name="connsiteX7" fmla="*/ 2448385 w 2448385"/>
+              <a:gd name="connsiteY7" fmla="*/ 387179 h 929230"/>
+              <a:gd name="connsiteX8" fmla="*/ 2448385 w 2448385"/>
+              <a:gd name="connsiteY8" fmla="*/ 929230 h 929230"/>
+              <a:gd name="connsiteX9" fmla="*/ 1145875 w 2448385"/>
+              <a:gd name="connsiteY9" fmla="*/ 929230 h 929230"/>
+              <a:gd name="connsiteX10" fmla="*/ 587656 w 2448385"/>
+              <a:gd name="connsiteY10" fmla="*/ 929230 h 929230"/>
+              <a:gd name="connsiteX11" fmla="*/ 587656 w 2448385"/>
+              <a:gd name="connsiteY11" fmla="*/ 929230 h 929230"/>
+              <a:gd name="connsiteX12" fmla="*/ 215510 w 2448385"/>
+              <a:gd name="connsiteY12" fmla="*/ 929230 h 929230"/>
+              <a:gd name="connsiteX13" fmla="*/ 205985 w 2448385"/>
+              <a:gd name="connsiteY13" fmla="*/ 787229 h 929230"/>
+              <a:gd name="connsiteX14" fmla="*/ 0 w 2448385"/>
+              <a:gd name="connsiteY14" fmla="*/ 390539 h 929230"/>
+              <a:gd name="connsiteX15" fmla="*/ 215510 w 2448385"/>
+              <a:gd name="connsiteY15" fmla="*/ 154872 h 929230"/>
+              <a:gd name="connsiteX16" fmla="*/ 215510 w 2448385"/>
+              <a:gd name="connsiteY16" fmla="*/ 0 h 929230"/>
+            </a:gdLst>
+            <a:ahLst/>
+            <a:cxnLst>
+              <a:cxn ang="0">
+                <a:pos x="connsiteX0" y="connsiteY0"/>
+              </a:cxn>
+              <a:cxn ang="0">
+                <a:pos x="connsiteX1" y="connsiteY1"/>
+              </a:cxn>
+              <a:cxn ang="0">
+                <a:pos x="connsiteX2" y="connsiteY2"/>
+              </a:cxn>
+              <a:cxn ang="0">
+                <a:pos x="connsiteX3" y="connsiteY3"/>
+              </a:cxn>
+              <a:cxn ang="0">
+                <a:pos x="connsiteX4" y="connsiteY4"/>
+              </a:cxn>
+              <a:cxn ang="0">
+                <a:pos x="connsiteX5" y="connsiteY5"/>
+              </a:cxn>
+              <a:cxn ang="0">
+                <a:pos x="connsiteX6" y="connsiteY6"/>
+              </a:cxn>
+              <a:cxn ang="0">
+                <a:pos x="connsiteX7" y="connsiteY7"/>
+              </a:cxn>
+              <a:cxn ang="0">
+                <a:pos x="connsiteX8" y="connsiteY8"/>
+              </a:cxn>
+              <a:cxn ang="0">
+                <a:pos x="connsiteX9" y="connsiteY9"/>
+              </a:cxn>
+              <a:cxn ang="0">
+                <a:pos x="connsiteX10" y="connsiteY10"/>
+              </a:cxn>
+              <a:cxn ang="0">
+                <a:pos x="connsiteX11" y="connsiteY11"/>
+              </a:cxn>
+              <a:cxn ang="0">
+                <a:pos x="connsiteX12" y="connsiteY12"/>
+              </a:cxn>
+              <a:cxn ang="0">
+                <a:pos x="connsiteX13" y="connsiteY13"/>
+              </a:cxn>
+              <a:cxn ang="0">
+                <a:pos x="connsiteX14" y="connsiteY14"/>
+              </a:cxn>
+              <a:cxn ang="0">
+                <a:pos x="connsiteX15" y="connsiteY15"/>
+              </a:cxn>
+              <a:cxn ang="0">
+                <a:pos x="connsiteX16" y="connsiteY16"/>
+              </a:cxn>
+            </a:cxnLst>
+            <a:rect l="l" t="t" r="r" b="b"/>
+            <a:pathLst>
+              <a:path w="2448385" h="929230">
+                <a:moveTo>
+                  <a:pt x="215510" y="0"/>
+                </a:moveTo>
+                <a:lnTo>
+                  <a:pt x="587656" y="0"/>
+                </a:lnTo>
+                <a:lnTo>
+                  <a:pt x="587656" y="0"/>
+                </a:lnTo>
+                <a:lnTo>
+                  <a:pt x="1145875" y="0"/>
+                </a:lnTo>
+                <a:lnTo>
+                  <a:pt x="2448385" y="0"/>
+                </a:lnTo>
+                <a:lnTo>
+                  <a:pt x="2448385" y="154872"/>
+                </a:lnTo>
+                <a:lnTo>
+                  <a:pt x="2448385" y="154872"/>
+                </a:lnTo>
+                <a:lnTo>
+                  <a:pt x="2448385" y="387179"/>
+                </a:lnTo>
+                <a:lnTo>
+                  <a:pt x="2448385" y="929230"/>
+                </a:lnTo>
+                <a:lnTo>
+                  <a:pt x="1145875" y="929230"/>
+                </a:lnTo>
+                <a:lnTo>
+                  <a:pt x="587656" y="929230"/>
+                </a:lnTo>
+                <a:lnTo>
+                  <a:pt x="587656" y="929230"/>
+                </a:lnTo>
+                <a:lnTo>
+                  <a:pt x="215510" y="929230"/>
+                </a:lnTo>
+                <a:lnTo>
+                  <a:pt x="205985" y="787229"/>
+                </a:lnTo>
+                <a:lnTo>
+                  <a:pt x="0" y="390539"/>
+                </a:lnTo>
+                <a:lnTo>
+                  <a:pt x="215510" y="154872"/>
+                </a:lnTo>
+                <a:lnTo>
+                  <a:pt x="215510" y="0"/>
+                </a:lnTo>
+                <a:close/>
+              </a:path>
+            </a:pathLst>
+          </a:custGeom>
+          <a:solidFill>
+            <a:schemeClr val="bg1"/>
+          </a:solidFill>
+        </p:spPr>
+        <p:txBody>
+          <a:bodyPr wrap="square" lIns="0" tIns="0" rIns="45720" bIns="0" anchor="ctr" anchorCtr="0">
+            <a:noAutofit/>
+          </a:bodyPr>
+          <a:lstStyle/>
+          <a:p>
+            <a:pPr algn="r"/>
+            <a:r>
+              <a:rPr lang="en-US" sz="8200" dirty="0" smtClean="0">
+                <a:ln w="19050">
+                  <a:solidFill>
+                    <a:schemeClr val="bg1"/>
+                  </a:solidFill>
+                </a:ln>
+                <a:solidFill>
+                  <a:srgbClr val="00B0F0"/>
+                </a:solidFill>
+                <a:latin typeface="Franklin Gothic Heavy" panose="020B0903020102020204" pitchFamily="34" charset="0"/>
+              </a:rPr>
+              <a:t>Bind</a:t>
+            </a:r>
+            <a:endParaRPr lang="en-US" sz="8200" dirty="0">
+              <a:ln w="19050">
+                <a:solidFill>
+                  <a:schemeClr val="bg1"/>
+                </a:solidFill>
+              </a:ln>
+              <a:solidFill>
+                <a:srgbClr val="00B0F0"/>
+              </a:solidFill>
+            </a:endParaRPr>
+          </a:p>
+        </p:txBody>
+      </p:sp>
+      <p:pic>
+        <p:nvPicPr>
+          <p:cNvPr id="5" name="Picture 4"/>
+          <p:cNvPicPr>
+            <a:picLocks noChangeAspect="1"/>
+          </p:cNvPicPr>
+          <p:nvPr/>
+        </p:nvPicPr>
+        <p:blipFill>
+          <a:blip r:embed="rId3"/>
+          <a:srcRect l="11986" t="27679" b="28571"/>
+          <a:stretch>
+            <a:fillRect/>
+          </a:stretch>
+        </p:blipFill>
+        <p:spPr>
+          <a:xfrm>
+            <a:off x="6454794" y="2884568"/>
+            <a:ext cx="4898957" cy="936196"/>
+          </a:xfrm>
+          <a:prstGeom prst="rect">
+            <a:avLst/>
+          </a:prstGeom>
+        </p:spPr>
+      </p:pic>
+    </p:spTree>
+    <p:extLst>
+      <p:ext uri="{BB962C8B-B14F-4D97-AF65-F5344CB8AC3E}">
+        <p14:creationId xmlns:p14="http://schemas.microsoft.com/office/powerpoint/2010/main" val="2400685200"/>
+      </p:ext>
+    </p:extLst>
+  </p:cSld>
+  <p:clrMapOvr>
+    <a:masterClrMapping/>
+  </p:clrMapOvr>
+</p:sld>
+</file>
+
 <file path=ppt/theme/theme1.xml><?xml version="1.0" encoding="utf-8"?>
 <a:theme xmlns:a="http://schemas.openxmlformats.org/drawingml/2006/main" name="Office Theme">
   <a:themeElements>

</xml_diff>